<commit_message>
Side-channel and internal model included
</commit_message>
<xml_diff>
--- a/images/image.pptx
+++ b/images/image.pptx
@@ -311,7 +311,7 @@
           <a:p>
             <a:fld id="{773E3A52-2DD2-6749-B427-C9A1D0BB55DF}" type="datetimeFigureOut">
               <a:rPr kumimoji="1" lang="zh-CN" altLang="en-US" smtClean="0"/>
-              <a:t>2018/2/13</a:t>
+              <a:t>2018/2/11</a:t>
             </a:fld>
             <a:endParaRPr kumimoji="1" lang="zh-CN" altLang="en-US"/>
           </a:p>
@@ -479,7 +479,7 @@
           <a:p>
             <a:fld id="{773E3A52-2DD2-6749-B427-C9A1D0BB55DF}" type="datetimeFigureOut">
               <a:rPr kumimoji="1" lang="zh-CN" altLang="en-US" smtClean="0"/>
-              <a:t>2018/2/13</a:t>
+              <a:t>2018/2/11</a:t>
             </a:fld>
             <a:endParaRPr kumimoji="1" lang="zh-CN" altLang="en-US"/>
           </a:p>
@@ -657,7 +657,7 @@
           <a:p>
             <a:fld id="{773E3A52-2DD2-6749-B427-C9A1D0BB55DF}" type="datetimeFigureOut">
               <a:rPr kumimoji="1" lang="zh-CN" altLang="en-US" smtClean="0"/>
-              <a:t>2018/2/13</a:t>
+              <a:t>2018/2/11</a:t>
             </a:fld>
             <a:endParaRPr kumimoji="1" lang="zh-CN" altLang="en-US"/>
           </a:p>
@@ -825,7 +825,7 @@
           <a:p>
             <a:fld id="{773E3A52-2DD2-6749-B427-C9A1D0BB55DF}" type="datetimeFigureOut">
               <a:rPr kumimoji="1" lang="zh-CN" altLang="en-US" smtClean="0"/>
-              <a:t>2018/2/13</a:t>
+              <a:t>2018/2/11</a:t>
             </a:fld>
             <a:endParaRPr kumimoji="1" lang="zh-CN" altLang="en-US"/>
           </a:p>
@@ -1070,7 +1070,7 @@
           <a:p>
             <a:fld id="{773E3A52-2DD2-6749-B427-C9A1D0BB55DF}" type="datetimeFigureOut">
               <a:rPr kumimoji="1" lang="zh-CN" altLang="en-US" smtClean="0"/>
-              <a:t>2018/2/13</a:t>
+              <a:t>2018/2/11</a:t>
             </a:fld>
             <a:endParaRPr kumimoji="1" lang="zh-CN" altLang="en-US"/>
           </a:p>
@@ -1355,7 +1355,7 @@
           <a:p>
             <a:fld id="{773E3A52-2DD2-6749-B427-C9A1D0BB55DF}" type="datetimeFigureOut">
               <a:rPr kumimoji="1" lang="zh-CN" altLang="en-US" smtClean="0"/>
-              <a:t>2018/2/13</a:t>
+              <a:t>2018/2/11</a:t>
             </a:fld>
             <a:endParaRPr kumimoji="1" lang="zh-CN" altLang="en-US"/>
           </a:p>
@@ -1774,7 +1774,7 @@
           <a:p>
             <a:fld id="{773E3A52-2DD2-6749-B427-C9A1D0BB55DF}" type="datetimeFigureOut">
               <a:rPr kumimoji="1" lang="zh-CN" altLang="en-US" smtClean="0"/>
-              <a:t>2018/2/13</a:t>
+              <a:t>2018/2/11</a:t>
             </a:fld>
             <a:endParaRPr kumimoji="1" lang="zh-CN" altLang="en-US"/>
           </a:p>
@@ -1891,7 +1891,7 @@
           <a:p>
             <a:fld id="{773E3A52-2DD2-6749-B427-C9A1D0BB55DF}" type="datetimeFigureOut">
               <a:rPr kumimoji="1" lang="zh-CN" altLang="en-US" smtClean="0"/>
-              <a:t>2018/2/13</a:t>
+              <a:t>2018/2/11</a:t>
             </a:fld>
             <a:endParaRPr kumimoji="1" lang="zh-CN" altLang="en-US"/>
           </a:p>
@@ -1986,7 +1986,7 @@
           <a:p>
             <a:fld id="{773E3A52-2DD2-6749-B427-C9A1D0BB55DF}" type="datetimeFigureOut">
               <a:rPr kumimoji="1" lang="zh-CN" altLang="en-US" smtClean="0"/>
-              <a:t>2018/2/13</a:t>
+              <a:t>2018/2/11</a:t>
             </a:fld>
             <a:endParaRPr kumimoji="1" lang="zh-CN" altLang="en-US"/>
           </a:p>
@@ -2261,7 +2261,7 @@
           <a:p>
             <a:fld id="{773E3A52-2DD2-6749-B427-C9A1D0BB55DF}" type="datetimeFigureOut">
               <a:rPr kumimoji="1" lang="zh-CN" altLang="en-US" smtClean="0"/>
-              <a:t>2018/2/13</a:t>
+              <a:t>2018/2/11</a:t>
             </a:fld>
             <a:endParaRPr kumimoji="1" lang="zh-CN" altLang="en-US"/>
           </a:p>
@@ -2513,7 +2513,7 @@
           <a:p>
             <a:fld id="{773E3A52-2DD2-6749-B427-C9A1D0BB55DF}" type="datetimeFigureOut">
               <a:rPr kumimoji="1" lang="zh-CN" altLang="en-US" smtClean="0"/>
-              <a:t>2018/2/13</a:t>
+              <a:t>2018/2/11</a:t>
             </a:fld>
             <a:endParaRPr kumimoji="1" lang="zh-CN" altLang="en-US"/>
           </a:p>
@@ -2724,7 +2724,7 @@
           <a:p>
             <a:fld id="{773E3A52-2DD2-6749-B427-C9A1D0BB55DF}" type="datetimeFigureOut">
               <a:rPr kumimoji="1" lang="zh-CN" altLang="en-US" smtClean="0"/>
-              <a:t>2018/2/13</a:t>
+              <a:t>2018/2/11</a:t>
             </a:fld>
             <a:endParaRPr kumimoji="1" lang="zh-CN" altLang="en-US"/>
           </a:p>
@@ -3183,8 +3183,8 @@
         </p:nvCxnSpPr>
         <p:spPr>
           <a:xfrm>
-            <a:off x="1374006" y="2229654"/>
-            <a:ext cx="0" cy="3224573"/>
+            <a:off x="1096265" y="1550894"/>
+            <a:ext cx="0" cy="3801035"/>
           </a:xfrm>
           <a:prstGeom prst="line">
             <a:avLst/>
@@ -3226,8 +3226,8 @@
         </p:nvCxnSpPr>
         <p:spPr>
           <a:xfrm>
-            <a:off x="6969096" y="2167539"/>
-            <a:ext cx="0" cy="3184390"/>
+            <a:off x="3030070" y="1524000"/>
+            <a:ext cx="0" cy="3827929"/>
           </a:xfrm>
           <a:prstGeom prst="line">
             <a:avLst/>
@@ -3269,8 +3269,8 @@
         </p:nvCxnSpPr>
         <p:spPr>
           <a:xfrm>
-            <a:off x="3119443" y="2215912"/>
-            <a:ext cx="39134" cy="3184390"/>
+            <a:off x="5012656" y="1524000"/>
+            <a:ext cx="0" cy="3827929"/>
           </a:xfrm>
           <a:prstGeom prst="line">
             <a:avLst/>
@@ -3311,9 +3311,9 @@
           <p:nvPr/>
         </p:nvCxnSpPr>
         <p:spPr>
-          <a:xfrm>
-            <a:off x="4965145" y="2209563"/>
-            <a:ext cx="16754" cy="3184390"/>
+          <a:xfrm flipH="1">
+            <a:off x="6948814" y="1524000"/>
+            <a:ext cx="1" cy="3827929"/>
           </a:xfrm>
           <a:prstGeom prst="line">
             <a:avLst/>
@@ -3353,7 +3353,7 @@
         </p:nvSpPr>
         <p:spPr>
           <a:xfrm>
-            <a:off x="6367437" y="1516010"/>
+            <a:off x="2448693" y="679592"/>
             <a:ext cx="1162755" cy="400110"/>
           </a:xfrm>
           <a:prstGeom prst="rect">
@@ -3396,7 +3396,7 @@
         </p:nvSpPr>
         <p:spPr>
           <a:xfrm>
-            <a:off x="1025192" y="1528781"/>
+            <a:off x="747451" y="704397"/>
             <a:ext cx="697628" cy="400110"/>
           </a:xfrm>
           <a:prstGeom prst="rect">
@@ -3439,8 +3439,8 @@
         </p:nvSpPr>
         <p:spPr>
           <a:xfrm>
-            <a:off x="2083909" y="1364539"/>
-            <a:ext cx="1621278" cy="707886"/>
+            <a:off x="4159567" y="595556"/>
+            <a:ext cx="1659750" cy="707886"/>
           </a:xfrm>
           <a:prstGeom prst="rect">
             <a:avLst/>
@@ -3456,7 +3456,7 @@
             <a:pPr algn="ctr"/>
             <a:r>
               <a:rPr lang="en-US" altLang="zh-CN" sz="2000" b="1" dirty="0"/>
-              <a:t>thinkgear.dll/</a:t>
+              <a:t>Thinkgear.dll/</a:t>
             </a:r>
           </a:p>
           <a:p>
@@ -3483,7 +3483,7 @@
         </p:nvSpPr>
         <p:spPr>
           <a:xfrm>
-            <a:off x="3908871" y="1177181"/>
+            <a:off x="5884164" y="441668"/>
             <a:ext cx="2129302" cy="1015663"/>
           </a:xfrm>
           <a:prstGeom prst="rect">
@@ -3532,6 +3532,231 @@
           </a:p>
         </p:txBody>
       </p:sp>
+      <p:cxnSp>
+        <p:nvCxnSpPr>
+          <p:cNvPr id="22" name="直接箭头连接符 21">
+            <a:extLst>
+              <a:ext uri="{FF2B5EF4-FFF2-40B4-BE49-F238E27FC236}">
+                <a16:creationId xmlns:a16="http://schemas.microsoft.com/office/drawing/2014/main" id="{B4D6398D-3FE0-4B38-B210-72EAAF62FC3E}"/>
+              </a:ext>
+            </a:extLst>
+          </p:cNvPr>
+          <p:cNvCxnSpPr>
+            <a:cxnSpLocks/>
+          </p:cNvCxnSpPr>
+          <p:nvPr/>
+        </p:nvCxnSpPr>
+        <p:spPr>
+          <a:xfrm flipV="1">
+            <a:off x="3030070" y="1531263"/>
+            <a:ext cx="3918744" cy="19631"/>
+          </a:xfrm>
+          <a:prstGeom prst="straightConnector1">
+            <a:avLst/>
+          </a:prstGeom>
+          <a:ln>
+            <a:solidFill>
+              <a:schemeClr val="tx1"/>
+            </a:solidFill>
+            <a:prstDash val="dash"/>
+            <a:tailEnd type="triangle"/>
+          </a:ln>
+        </p:spPr>
+        <p:style>
+          <a:lnRef idx="2">
+            <a:schemeClr val="accent1"/>
+          </a:lnRef>
+          <a:fillRef idx="0">
+            <a:schemeClr val="accent1"/>
+          </a:fillRef>
+          <a:effectRef idx="1">
+            <a:schemeClr val="accent1"/>
+          </a:effectRef>
+          <a:fontRef idx="minor">
+            <a:schemeClr val="tx1"/>
+          </a:fontRef>
+        </p:style>
+      </p:cxnSp>
+      <p:sp>
+        <p:nvSpPr>
+          <p:cNvPr id="24" name="文本框 23">
+            <a:extLst>
+              <a:ext uri="{FF2B5EF4-FFF2-40B4-BE49-F238E27FC236}">
+                <a16:creationId xmlns:a16="http://schemas.microsoft.com/office/drawing/2014/main" id="{FF5EAE29-E9B3-47EA-AFD7-68928983B8F5}"/>
+              </a:ext>
+            </a:extLst>
+          </p:cNvPr>
+          <p:cNvSpPr txBox="1"/>
+          <p:nvPr/>
+        </p:nvSpPr>
+        <p:spPr>
+          <a:xfrm>
+            <a:off x="3297414" y="1206532"/>
+            <a:ext cx="1075936" cy="338554"/>
+          </a:xfrm>
+          <a:prstGeom prst="rect">
+            <a:avLst/>
+          </a:prstGeom>
+          <a:noFill/>
+          <a:ln>
+            <a:noFill/>
+          </a:ln>
+        </p:spPr>
+        <p:txBody>
+          <a:bodyPr wrap="none" rtlCol="0">
+            <a:spAutoFit/>
+          </a:bodyPr>
+          <a:lstStyle/>
+          <a:p>
+            <a:r>
+              <a:rPr lang="en-US" altLang="zh-CN" sz="1600" dirty="0">
+                <a:latin typeface="Times New Roman" panose="02020603050405020304" pitchFamily="18" charset="0"/>
+                <a:cs typeface="Times New Roman" panose="02020603050405020304" pitchFamily="18" charset="0"/>
+              </a:rPr>
+              <a:t>1. Register</a:t>
+            </a:r>
+            <a:endParaRPr lang="zh-CN" altLang="en-US" sz="1600" dirty="0">
+              <a:latin typeface="Times New Roman" panose="02020603050405020304" pitchFamily="18" charset="0"/>
+              <a:cs typeface="Times New Roman" panose="02020603050405020304" pitchFamily="18" charset="0"/>
+            </a:endParaRPr>
+          </a:p>
+        </p:txBody>
+      </p:sp>
+      <p:cxnSp>
+        <p:nvCxnSpPr>
+          <p:cNvPr id="25" name="直接箭头连接符 24">
+            <a:extLst>
+              <a:ext uri="{FF2B5EF4-FFF2-40B4-BE49-F238E27FC236}">
+                <a16:creationId xmlns:a16="http://schemas.microsoft.com/office/drawing/2014/main" id="{ABCC85F2-0B1A-4606-AB97-E7456E5F6D49}"/>
+              </a:ext>
+            </a:extLst>
+          </p:cNvPr>
+          <p:cNvCxnSpPr>
+            <a:cxnSpLocks/>
+          </p:cNvCxnSpPr>
+          <p:nvPr/>
+        </p:nvCxnSpPr>
+        <p:spPr>
+          <a:xfrm flipH="1">
+            <a:off x="3030070" y="1610772"/>
+            <a:ext cx="3918744" cy="556768"/>
+          </a:xfrm>
+          <a:prstGeom prst="straightConnector1">
+            <a:avLst/>
+          </a:prstGeom>
+          <a:ln>
+            <a:solidFill>
+              <a:schemeClr val="tx1"/>
+            </a:solidFill>
+            <a:prstDash val="dash"/>
+            <a:tailEnd type="triangle"/>
+          </a:ln>
+        </p:spPr>
+        <p:style>
+          <a:lnRef idx="2">
+            <a:schemeClr val="accent1"/>
+          </a:lnRef>
+          <a:fillRef idx="0">
+            <a:schemeClr val="accent1"/>
+          </a:fillRef>
+          <a:effectRef idx="1">
+            <a:schemeClr val="accent1"/>
+          </a:effectRef>
+          <a:fontRef idx="minor">
+            <a:schemeClr val="tx1"/>
+          </a:fontRef>
+        </p:style>
+      </p:cxnSp>
+      <p:sp>
+        <p:nvSpPr>
+          <p:cNvPr id="28" name="文本框 27">
+            <a:extLst>
+              <a:ext uri="{FF2B5EF4-FFF2-40B4-BE49-F238E27FC236}">
+                <a16:creationId xmlns:a16="http://schemas.microsoft.com/office/drawing/2014/main" id="{2C670646-4427-4FBF-9629-B3E67C874D03}"/>
+              </a:ext>
+            </a:extLst>
+          </p:cNvPr>
+          <p:cNvSpPr txBox="1"/>
+          <p:nvPr/>
+        </p:nvSpPr>
+        <p:spPr>
+          <a:xfrm rot="21167791">
+            <a:off x="3044202" y="1715021"/>
+            <a:ext cx="2008627" cy="338554"/>
+          </a:xfrm>
+          <a:prstGeom prst="rect">
+            <a:avLst/>
+          </a:prstGeom>
+          <a:noFill/>
+          <a:ln>
+            <a:noFill/>
+          </a:ln>
+        </p:spPr>
+        <p:txBody>
+          <a:bodyPr wrap="none" rtlCol="0">
+            <a:spAutoFit/>
+          </a:bodyPr>
+          <a:lstStyle/>
+          <a:p>
+            <a:r>
+              <a:rPr lang="en-US" altLang="zh-CN" sz="1600" dirty="0">
+                <a:latin typeface="Times New Roman" panose="02020603050405020304" pitchFamily="18" charset="0"/>
+                <a:cs typeface="Times New Roman" panose="02020603050405020304" pitchFamily="18" charset="0"/>
+              </a:rPr>
+              <a:t>2. App ID, App Secret</a:t>
+            </a:r>
+            <a:endParaRPr lang="zh-CN" altLang="en-US" sz="1600" dirty="0">
+              <a:latin typeface="Times New Roman" panose="02020603050405020304" pitchFamily="18" charset="0"/>
+              <a:cs typeface="Times New Roman" panose="02020603050405020304" pitchFamily="18" charset="0"/>
+            </a:endParaRPr>
+          </a:p>
+        </p:txBody>
+      </p:sp>
+      <p:cxnSp>
+        <p:nvCxnSpPr>
+          <p:cNvPr id="34" name="直接箭头连接符 33">
+            <a:extLst>
+              <a:ext uri="{FF2B5EF4-FFF2-40B4-BE49-F238E27FC236}">
+                <a16:creationId xmlns:a16="http://schemas.microsoft.com/office/drawing/2014/main" id="{65793119-C874-41C6-A5AB-D8C32525FC0A}"/>
+              </a:ext>
+            </a:extLst>
+          </p:cNvPr>
+          <p:cNvCxnSpPr>
+            <a:cxnSpLocks/>
+          </p:cNvCxnSpPr>
+          <p:nvPr/>
+        </p:nvCxnSpPr>
+        <p:spPr>
+          <a:xfrm>
+            <a:off x="3041007" y="2473570"/>
+            <a:ext cx="1958539" cy="265275"/>
+          </a:xfrm>
+          <a:prstGeom prst="straightConnector1">
+            <a:avLst/>
+          </a:prstGeom>
+          <a:ln>
+            <a:solidFill>
+              <a:schemeClr val="tx1"/>
+            </a:solidFill>
+            <a:prstDash val="dash"/>
+            <a:tailEnd type="triangle"/>
+          </a:ln>
+        </p:spPr>
+        <p:style>
+          <a:lnRef idx="2">
+            <a:schemeClr val="accent1"/>
+          </a:lnRef>
+          <a:fillRef idx="0">
+            <a:schemeClr val="accent1"/>
+          </a:fillRef>
+          <a:effectRef idx="1">
+            <a:schemeClr val="accent1"/>
+          </a:effectRef>
+          <a:fontRef idx="minor">
+            <a:schemeClr val="tx1"/>
+          </a:fontRef>
+        </p:style>
+      </p:cxnSp>
       <p:sp>
         <p:nvSpPr>
           <p:cNvPr id="37" name="文本框 36">
@@ -3545,8 +3770,8 @@
           <p:nvPr/>
         </p:nvSpPr>
         <p:spPr>
-          <a:xfrm rot="21059438">
-            <a:off x="4939110" y="2131856"/>
+          <a:xfrm rot="414648">
+            <a:off x="3044431" y="2287153"/>
             <a:ext cx="2008627" cy="338554"/>
           </a:xfrm>
           <a:prstGeom prst="rect">
@@ -3568,7 +3793,7 @@
                 <a:latin typeface="Times New Roman" panose="02020603050405020304" pitchFamily="18" charset="0"/>
                 <a:cs typeface="Times New Roman" panose="02020603050405020304" pitchFamily="18" charset="0"/>
               </a:rPr>
-              <a:t>1. App ID, App Secret</a:t>
+              <a:t>3. App ID, App Secret</a:t>
             </a:r>
             <a:endParaRPr lang="zh-CN" altLang="en-US" sz="1600" dirty="0">
               <a:latin typeface="Times New Roman" panose="02020603050405020304" pitchFamily="18" charset="0"/>
@@ -3592,9 +3817,9 @@
           <p:nvPr/>
         </p:nvCxnSpPr>
         <p:spPr>
-          <a:xfrm flipH="1">
-            <a:off x="4994129" y="2294916"/>
-            <a:ext cx="1904857" cy="324346"/>
+          <a:xfrm>
+            <a:off x="4973522" y="2728435"/>
+            <a:ext cx="1958539" cy="265275"/>
           </a:xfrm>
           <a:prstGeom prst="straightConnector1">
             <a:avLst/>
@@ -3622,6 +3847,51 @@
           </a:fontRef>
         </p:style>
       </p:cxnSp>
+      <p:sp>
+        <p:nvSpPr>
+          <p:cNvPr id="39" name="文本框 38">
+            <a:extLst>
+              <a:ext uri="{FF2B5EF4-FFF2-40B4-BE49-F238E27FC236}">
+                <a16:creationId xmlns:a16="http://schemas.microsoft.com/office/drawing/2014/main" id="{D963AD81-F58A-46AA-B2AC-5C0E6FD0CE4B}"/>
+              </a:ext>
+            </a:extLst>
+          </p:cNvPr>
+          <p:cNvSpPr txBox="1"/>
+          <p:nvPr/>
+        </p:nvSpPr>
+        <p:spPr>
+          <a:xfrm rot="414648">
+            <a:off x="4976946" y="2542018"/>
+            <a:ext cx="2008627" cy="338554"/>
+          </a:xfrm>
+          <a:prstGeom prst="rect">
+            <a:avLst/>
+          </a:prstGeom>
+          <a:noFill/>
+          <a:ln>
+            <a:noFill/>
+          </a:ln>
+        </p:spPr>
+        <p:txBody>
+          <a:bodyPr wrap="none" rtlCol="0">
+            <a:spAutoFit/>
+          </a:bodyPr>
+          <a:lstStyle/>
+          <a:p>
+            <a:r>
+              <a:rPr lang="en-US" altLang="zh-CN" sz="1600" dirty="0">
+                <a:latin typeface="Times New Roman" panose="02020603050405020304" pitchFamily="18" charset="0"/>
+                <a:cs typeface="Times New Roman" panose="02020603050405020304" pitchFamily="18" charset="0"/>
+              </a:rPr>
+              <a:t>4. App ID, App Secret</a:t>
+            </a:r>
+            <a:endParaRPr lang="zh-CN" altLang="en-US" sz="1600" dirty="0">
+              <a:latin typeface="Times New Roman" panose="02020603050405020304" pitchFamily="18" charset="0"/>
+              <a:cs typeface="Times New Roman" panose="02020603050405020304" pitchFamily="18" charset="0"/>
+            </a:endParaRPr>
+          </a:p>
+        </p:txBody>
+      </p:sp>
       <p:cxnSp>
         <p:nvCxnSpPr>
           <p:cNvPr id="40" name="直接箭头连接符 39">
@@ -3637,9 +3907,9 @@
           <p:nvPr/>
         </p:nvCxnSpPr>
         <p:spPr>
-          <a:xfrm flipV="1">
-            <a:off x="1432241" y="3151922"/>
-            <a:ext cx="3486785" cy="98227"/>
+          <a:xfrm flipH="1">
+            <a:off x="1096266" y="3014511"/>
+            <a:ext cx="5802720" cy="177197"/>
           </a:xfrm>
           <a:prstGeom prst="straightConnector1">
             <a:avLst/>
@@ -3703,7 +3973,7 @@
                 <a:latin typeface="Times New Roman" panose="02020603050405020304" pitchFamily="18" charset="0"/>
                 <a:cs typeface="Times New Roman" panose="02020603050405020304" pitchFamily="18" charset="0"/>
               </a:rPr>
-              <a:t>2. App ID</a:t>
+              <a:t>5. App ID</a:t>
             </a:r>
             <a:endParaRPr lang="zh-CN" altLang="en-US" sz="1600" dirty="0">
               <a:latin typeface="Times New Roman" panose="02020603050405020304" pitchFamily="18" charset="0"/>
@@ -3727,9 +3997,9 @@
           <p:nvPr/>
         </p:nvCxnSpPr>
         <p:spPr>
-          <a:xfrm flipH="1">
-            <a:off x="1363945" y="2817439"/>
-            <a:ext cx="3609578" cy="386530"/>
+          <a:xfrm>
+            <a:off x="1121180" y="3220744"/>
+            <a:ext cx="5827635" cy="0"/>
           </a:xfrm>
           <a:prstGeom prst="straightConnector1">
             <a:avLst/>
@@ -3771,7 +4041,7 @@
         </p:nvSpPr>
         <p:spPr>
           <a:xfrm>
-            <a:off x="5022299" y="3190989"/>
+            <a:off x="6998645" y="3220744"/>
             <a:ext cx="235860" cy="650952"/>
           </a:xfrm>
           <a:prstGeom prst="rightBrace">
@@ -3820,8 +4090,8 @@
         </p:nvSpPr>
         <p:spPr>
           <a:xfrm>
-            <a:off x="5091187" y="3151922"/>
-            <a:ext cx="1635634" cy="584775"/>
+            <a:off x="7116575" y="3220744"/>
+            <a:ext cx="1383713" cy="584775"/>
           </a:xfrm>
           <a:prstGeom prst="rect">
             <a:avLst/>
@@ -3832,7 +4102,7 @@
           </a:ln>
         </p:spPr>
         <p:txBody>
-          <a:bodyPr wrap="square" rtlCol="0">
+          <a:bodyPr wrap="none" rtlCol="0">
             <a:spAutoFit/>
           </a:bodyPr>
           <a:lstStyle/>
@@ -3843,7 +4113,7 @@
                 <a:latin typeface="Times New Roman" panose="02020603050405020304" pitchFamily="18" charset="0"/>
                 <a:cs typeface="Times New Roman" panose="02020603050405020304" pitchFamily="18" charset="0"/>
               </a:rPr>
-              <a:t>3. User grants </a:t>
+              <a:t>6. User grants </a:t>
             </a:r>
           </a:p>
           <a:p>
@@ -3878,8 +4148,8 @@
         </p:nvCxnSpPr>
         <p:spPr>
           <a:xfrm flipH="1">
-            <a:off x="3182715" y="3886201"/>
-            <a:ext cx="1683927" cy="238441"/>
+            <a:off x="5066130" y="3898590"/>
+            <a:ext cx="1832856" cy="140089"/>
           </a:xfrm>
           <a:prstGeom prst="straightConnector1">
             <a:avLst/>
@@ -3920,8 +4190,8 @@
           <p:nvPr/>
         </p:nvSpPr>
         <p:spPr>
-          <a:xfrm rot="21299219">
-            <a:off x="3277000" y="3675580"/>
+          <a:xfrm rot="21404970">
+            <a:off x="5238074" y="3657366"/>
             <a:ext cx="1517851" cy="338554"/>
           </a:xfrm>
           <a:prstGeom prst="rect">
@@ -3943,7 +4213,7 @@
                 <a:latin typeface="Times New Roman" panose="02020603050405020304" pitchFamily="18" charset="0"/>
                 <a:cs typeface="Times New Roman" panose="02020603050405020304" pitchFamily="18" charset="0"/>
               </a:rPr>
-              <a:t>4. Access Token</a:t>
+              <a:t>7. Access Token</a:t>
             </a:r>
             <a:endParaRPr lang="zh-CN" altLang="en-US" sz="1600" dirty="0">
               <a:latin typeface="Times New Roman" panose="02020603050405020304" pitchFamily="18" charset="0"/>
@@ -3967,9 +4237,9 @@
           <p:nvPr/>
         </p:nvCxnSpPr>
         <p:spPr>
-          <a:xfrm>
-            <a:off x="4999546" y="3866632"/>
-            <a:ext cx="1949269" cy="240622"/>
+          <a:xfrm flipH="1">
+            <a:off x="3102661" y="4050990"/>
+            <a:ext cx="1832856" cy="140089"/>
           </a:xfrm>
           <a:prstGeom prst="straightConnector1">
             <a:avLst/>
@@ -3997,6 +4267,51 @@
           </a:fontRef>
         </p:style>
       </p:cxnSp>
+      <p:sp>
+        <p:nvSpPr>
+          <p:cNvPr id="65" name="文本框 64">
+            <a:extLst>
+              <a:ext uri="{FF2B5EF4-FFF2-40B4-BE49-F238E27FC236}">
+                <a16:creationId xmlns:a16="http://schemas.microsoft.com/office/drawing/2014/main" id="{B2DA09F5-E16F-47FD-B12F-3C2FB26EE84A}"/>
+              </a:ext>
+            </a:extLst>
+          </p:cNvPr>
+          <p:cNvSpPr txBox="1"/>
+          <p:nvPr/>
+        </p:nvSpPr>
+        <p:spPr>
+          <a:xfrm rot="21404970">
+            <a:off x="3274605" y="3809766"/>
+            <a:ext cx="1517851" cy="338554"/>
+          </a:xfrm>
+          <a:prstGeom prst="rect">
+            <a:avLst/>
+          </a:prstGeom>
+          <a:noFill/>
+          <a:ln>
+            <a:noFill/>
+          </a:ln>
+        </p:spPr>
+        <p:txBody>
+          <a:bodyPr wrap="none" rtlCol="0">
+            <a:spAutoFit/>
+          </a:bodyPr>
+          <a:lstStyle/>
+          <a:p>
+            <a:r>
+              <a:rPr lang="en-US" altLang="zh-CN" sz="1600" dirty="0">
+                <a:latin typeface="Times New Roman" panose="02020603050405020304" pitchFamily="18" charset="0"/>
+                <a:cs typeface="Times New Roman" panose="02020603050405020304" pitchFamily="18" charset="0"/>
+              </a:rPr>
+              <a:t>8. Access Token</a:t>
+            </a:r>
+            <a:endParaRPr lang="zh-CN" altLang="en-US" sz="1600" dirty="0">
+              <a:latin typeface="Times New Roman" panose="02020603050405020304" pitchFamily="18" charset="0"/>
+              <a:cs typeface="Times New Roman" panose="02020603050405020304" pitchFamily="18" charset="0"/>
+            </a:endParaRPr>
+          </a:p>
+        </p:txBody>
+      </p:sp>
       <p:cxnSp>
         <p:nvCxnSpPr>
           <p:cNvPr id="68" name="直接箭头连接符 67">
@@ -4012,9 +4327,9 @@
           <p:nvPr/>
         </p:nvCxnSpPr>
         <p:spPr>
-          <a:xfrm flipH="1">
-            <a:off x="3175633" y="4394197"/>
-            <a:ext cx="3723355" cy="346815"/>
+          <a:xfrm>
+            <a:off x="3131544" y="4508734"/>
+            <a:ext cx="1868002" cy="249339"/>
           </a:xfrm>
           <a:prstGeom prst="straightConnector1">
             <a:avLst/>
@@ -4042,6 +4357,51 @@
           </a:fontRef>
         </p:style>
       </p:cxnSp>
+      <p:sp>
+        <p:nvSpPr>
+          <p:cNvPr id="69" name="文本框 68">
+            <a:extLst>
+              <a:ext uri="{FF2B5EF4-FFF2-40B4-BE49-F238E27FC236}">
+                <a16:creationId xmlns:a16="http://schemas.microsoft.com/office/drawing/2014/main" id="{F90B46A3-51EB-4ECE-B525-3569C60E73EE}"/>
+              </a:ext>
+            </a:extLst>
+          </p:cNvPr>
+          <p:cNvSpPr txBox="1"/>
+          <p:nvPr/>
+        </p:nvSpPr>
+        <p:spPr>
+          <a:xfrm rot="425566">
+            <a:off x="3281320" y="4339457"/>
+            <a:ext cx="1517851" cy="338554"/>
+          </a:xfrm>
+          <a:prstGeom prst="rect">
+            <a:avLst/>
+          </a:prstGeom>
+          <a:noFill/>
+          <a:ln>
+            <a:noFill/>
+          </a:ln>
+        </p:spPr>
+        <p:txBody>
+          <a:bodyPr wrap="square" rtlCol="0">
+            <a:spAutoFit/>
+          </a:bodyPr>
+          <a:lstStyle/>
+          <a:p>
+            <a:r>
+              <a:rPr lang="en-US" altLang="zh-CN" sz="1600" dirty="0">
+                <a:latin typeface="Times New Roman" panose="02020603050405020304" pitchFamily="18" charset="0"/>
+                <a:cs typeface="Times New Roman" panose="02020603050405020304" pitchFamily="18" charset="0"/>
+              </a:rPr>
+              <a:t>9. Access Token</a:t>
+            </a:r>
+            <a:endParaRPr lang="zh-CN" altLang="en-US" sz="1600" dirty="0">
+              <a:latin typeface="Times New Roman" panose="02020603050405020304" pitchFamily="18" charset="0"/>
+              <a:cs typeface="Times New Roman" panose="02020603050405020304" pitchFamily="18" charset="0"/>
+            </a:endParaRPr>
+          </a:p>
+        </p:txBody>
+      </p:sp>
       <p:cxnSp>
         <p:nvCxnSpPr>
           <p:cNvPr id="77" name="直接箭头连接符 76">
@@ -4057,9 +4417,9 @@
           <p:nvPr/>
         </p:nvCxnSpPr>
         <p:spPr>
-          <a:xfrm>
-            <a:off x="3165818" y="4778546"/>
-            <a:ext cx="3769958" cy="212961"/>
+          <a:xfrm flipH="1">
+            <a:off x="3079900" y="4826388"/>
+            <a:ext cx="1879283" cy="249339"/>
           </a:xfrm>
           <a:prstGeom prst="straightConnector1">
             <a:avLst/>
@@ -4100,8 +4460,8 @@
           <p:nvPr/>
         </p:nvSpPr>
         <p:spPr>
-          <a:xfrm rot="277058">
-            <a:off x="5231167" y="4637246"/>
+          <a:xfrm rot="21119689">
+            <a:off x="3122956" y="4678756"/>
             <a:ext cx="1517851" cy="338554"/>
           </a:xfrm>
           <a:prstGeom prst="rect">
@@ -4123,97 +4483,7 @@
                 <a:latin typeface="Times New Roman" panose="02020603050405020304" pitchFamily="18" charset="0"/>
                 <a:cs typeface="Times New Roman" panose="02020603050405020304" pitchFamily="18" charset="0"/>
               </a:rPr>
-              <a:t>6. EEG Data</a:t>
-            </a:r>
-            <a:endParaRPr lang="zh-CN" altLang="en-US" sz="1600" dirty="0">
-              <a:latin typeface="Times New Roman" panose="02020603050405020304" pitchFamily="18" charset="0"/>
-              <a:cs typeface="Times New Roman" panose="02020603050405020304" pitchFamily="18" charset="0"/>
-            </a:endParaRPr>
-          </a:p>
-        </p:txBody>
-      </p:sp>
-      <p:sp>
-        <p:nvSpPr>
-          <p:cNvPr id="41" name="文本框 62">
-            <a:extLst>
-              <a:ext uri="{FF2B5EF4-FFF2-40B4-BE49-F238E27FC236}">
-                <a16:creationId xmlns:a16="http://schemas.microsoft.com/office/drawing/2014/main" id="{3676B3E7-E5F0-47CB-BC52-0430FF14376E}"/>
-              </a:ext>
-            </a:extLst>
-          </p:cNvPr>
-          <p:cNvSpPr txBox="1"/>
-          <p:nvPr/>
-        </p:nvSpPr>
-        <p:spPr>
-          <a:xfrm rot="400253">
-            <a:off x="5283123" y="3716924"/>
-            <a:ext cx="1517851" cy="338554"/>
-          </a:xfrm>
-          <a:prstGeom prst="rect">
-            <a:avLst/>
-          </a:prstGeom>
-          <a:noFill/>
-          <a:ln>
-            <a:noFill/>
-          </a:ln>
-        </p:spPr>
-        <p:txBody>
-          <a:bodyPr wrap="none" rtlCol="0">
-            <a:spAutoFit/>
-          </a:bodyPr>
-          <a:lstStyle/>
-          <a:p>
-            <a:r>
-              <a:rPr lang="en-US" altLang="zh-CN" sz="1600" dirty="0">
-                <a:latin typeface="Times New Roman" panose="02020603050405020304" pitchFamily="18" charset="0"/>
-                <a:cs typeface="Times New Roman" panose="02020603050405020304" pitchFamily="18" charset="0"/>
-              </a:rPr>
-              <a:t>4. Access Token</a:t>
-            </a:r>
-            <a:endParaRPr lang="zh-CN" altLang="en-US" sz="1600" dirty="0">
-              <a:latin typeface="Times New Roman" panose="02020603050405020304" pitchFamily="18" charset="0"/>
-              <a:cs typeface="Times New Roman" panose="02020603050405020304" pitchFamily="18" charset="0"/>
-            </a:endParaRPr>
-          </a:p>
-        </p:txBody>
-      </p:sp>
-      <p:sp>
-        <p:nvSpPr>
-          <p:cNvPr id="45" name="文本框 62">
-            <a:extLst>
-              <a:ext uri="{FF2B5EF4-FFF2-40B4-BE49-F238E27FC236}">
-                <a16:creationId xmlns:a16="http://schemas.microsoft.com/office/drawing/2014/main" id="{A6FE5908-9BD2-43E0-A49F-0CAC37837052}"/>
-              </a:ext>
-            </a:extLst>
-          </p:cNvPr>
-          <p:cNvSpPr txBox="1"/>
-          <p:nvPr/>
-        </p:nvSpPr>
-        <p:spPr>
-          <a:xfrm rot="21247029">
-            <a:off x="3363598" y="4300406"/>
-            <a:ext cx="1517851" cy="338554"/>
-          </a:xfrm>
-          <a:prstGeom prst="rect">
-            <a:avLst/>
-          </a:prstGeom>
-          <a:noFill/>
-          <a:ln>
-            <a:noFill/>
-          </a:ln>
-        </p:spPr>
-        <p:txBody>
-          <a:bodyPr wrap="none" rtlCol="0">
-            <a:spAutoFit/>
-          </a:bodyPr>
-          <a:lstStyle/>
-          <a:p>
-            <a:r>
-              <a:rPr lang="en-US" altLang="zh-CN" sz="1600" dirty="0">
-                <a:latin typeface="Times New Roman" panose="02020603050405020304" pitchFamily="18" charset="0"/>
-                <a:cs typeface="Times New Roman" panose="02020603050405020304" pitchFamily="18" charset="0"/>
-              </a:rPr>
-              <a:t>5. Access Token</a:t>
+              <a:t>10. EEG Data</a:t>
             </a:r>
             <a:endParaRPr lang="zh-CN" altLang="en-US" sz="1600" dirty="0">
               <a:latin typeface="Times New Roman" panose="02020603050405020304" pitchFamily="18" charset="0"/>
@@ -10642,7 +10912,7 @@
           <a:graphicData uri="http://schemas.openxmlformats.org/presentationml/2006/ole">
             <mc:AlternateContent xmlns:mc="http://schemas.openxmlformats.org/markup-compatibility/2006">
               <mc:Choice xmlns:v="urn:schemas-microsoft-com:vml" Requires="v">
-                <p:oleObj spid="_x0000_s2450" name="公式" r:id="rId3" imgW="609600" imgH="431800" progId="Equation.3">
+                <p:oleObj spid="_x0000_s2226" name="公式" r:id="rId3" imgW="609600" imgH="431800" progId="Equation.3">
                   <p:embed/>
                 </p:oleObj>
               </mc:Choice>
@@ -10894,7 +11164,7 @@
           <a:graphicData uri="http://schemas.openxmlformats.org/presentationml/2006/ole">
             <mc:AlternateContent xmlns:mc="http://schemas.openxmlformats.org/markup-compatibility/2006">
               <mc:Choice xmlns:v="urn:schemas-microsoft-com:vml" Requires="v">
-                <p:oleObj spid="_x0000_s2451" name="公式" r:id="rId5" imgW="609600" imgH="431800" progId="Equation.3">
+                <p:oleObj spid="_x0000_s2227" name="公式" r:id="rId5" imgW="609600" imgH="431800" progId="Equation.3">
                   <p:embed/>
                 </p:oleObj>
               </mc:Choice>
@@ -10951,7 +11221,7 @@
           <a:graphicData uri="http://schemas.openxmlformats.org/presentationml/2006/ole">
             <mc:AlternateContent xmlns:mc="http://schemas.openxmlformats.org/markup-compatibility/2006">
               <mc:Choice xmlns:v="urn:schemas-microsoft-com:vml" Requires="v">
-                <p:oleObj spid="_x0000_s2452" name="公式" r:id="rId7" imgW="482600" imgH="177800" progId="Equation.3">
+                <p:oleObj spid="_x0000_s2228" name="公式" r:id="rId7" imgW="482600" imgH="177800" progId="Equation.3">
                   <p:embed/>
                 </p:oleObj>
               </mc:Choice>
@@ -11008,7 +11278,7 @@
           <a:graphicData uri="http://schemas.openxmlformats.org/presentationml/2006/ole">
             <mc:AlternateContent xmlns:mc="http://schemas.openxmlformats.org/markup-compatibility/2006">
               <mc:Choice xmlns:v="urn:schemas-microsoft-com:vml" Requires="v">
-                <p:oleObj spid="_x0000_s2453" name="公式" r:id="rId9" imgW="292100" imgH="177800" progId="Equation.3">
+                <p:oleObj spid="_x0000_s2229" name="公式" r:id="rId9" imgW="292100" imgH="177800" progId="Equation.3">
                   <p:embed/>
                 </p:oleObj>
               </mc:Choice>
@@ -11065,7 +11335,7 @@
           <a:graphicData uri="http://schemas.openxmlformats.org/presentationml/2006/ole">
             <mc:AlternateContent xmlns:mc="http://schemas.openxmlformats.org/markup-compatibility/2006">
               <mc:Choice xmlns:v="urn:schemas-microsoft-com:vml" Requires="v">
-                <p:oleObj spid="_x0000_s2454" name="公式" r:id="rId11" imgW="368300" imgH="177800" progId="Equation.3">
+                <p:oleObj spid="_x0000_s2230" name="公式" r:id="rId11" imgW="368300" imgH="177800" progId="Equation.3">
                   <p:embed/>
                 </p:oleObj>
               </mc:Choice>
@@ -11204,7 +11474,7 @@
           <a:graphicData uri="http://schemas.openxmlformats.org/presentationml/2006/ole">
             <mc:AlternateContent xmlns:mc="http://schemas.openxmlformats.org/markup-compatibility/2006">
               <mc:Choice xmlns:v="urn:schemas-microsoft-com:vml" Requires="v">
-                <p:oleObj spid="_x0000_s2455" name="公式" r:id="rId13" imgW="292100" imgH="177800" progId="Equation.3">
+                <p:oleObj spid="_x0000_s2231" name="公式" r:id="rId13" imgW="292100" imgH="177800" progId="Equation.3">
                   <p:embed/>
                 </p:oleObj>
               </mc:Choice>
@@ -11261,7 +11531,7 @@
           <a:graphicData uri="http://schemas.openxmlformats.org/presentationml/2006/ole">
             <mc:AlternateContent xmlns:mc="http://schemas.openxmlformats.org/markup-compatibility/2006">
               <mc:Choice xmlns:v="urn:schemas-microsoft-com:vml" Requires="v">
-                <p:oleObj spid="_x0000_s2456" name="公式" r:id="rId14" imgW="292100" imgH="177800" progId="Equation.3">
+                <p:oleObj spid="_x0000_s2232" name="公式" r:id="rId14" imgW="292100" imgH="177800" progId="Equation.3">
                   <p:embed/>
                 </p:oleObj>
               </mc:Choice>
@@ -11318,7 +11588,7 @@
           <a:graphicData uri="http://schemas.openxmlformats.org/presentationml/2006/ole">
             <mc:AlternateContent xmlns:mc="http://schemas.openxmlformats.org/markup-compatibility/2006">
               <mc:Choice xmlns:v="urn:schemas-microsoft-com:vml" Requires="v">
-                <p:oleObj spid="_x0000_s2457" name="公式" r:id="rId16" imgW="292100" imgH="177800" progId="Equation.3">
+                <p:oleObj spid="_x0000_s2233" name="公式" r:id="rId16" imgW="292100" imgH="177800" progId="Equation.3">
                   <p:embed/>
                 </p:oleObj>
               </mc:Choice>
@@ -11375,7 +11645,7 @@
           <a:graphicData uri="http://schemas.openxmlformats.org/presentationml/2006/ole">
             <mc:AlternateContent xmlns:mc="http://schemas.openxmlformats.org/markup-compatibility/2006">
               <mc:Choice xmlns:v="urn:schemas-microsoft-com:vml" Requires="v">
-                <p:oleObj spid="_x0000_s2458" name="公式" r:id="rId17" imgW="292100" imgH="177800" progId="Equation.3">
+                <p:oleObj spid="_x0000_s2234" name="公式" r:id="rId17" imgW="292100" imgH="177800" progId="Equation.3">
                   <p:embed/>
                 </p:oleObj>
               </mc:Choice>
@@ -11432,7 +11702,7 @@
           <a:graphicData uri="http://schemas.openxmlformats.org/presentationml/2006/ole">
             <mc:AlternateContent xmlns:mc="http://schemas.openxmlformats.org/markup-compatibility/2006">
               <mc:Choice xmlns:v="urn:schemas-microsoft-com:vml" Requires="v">
-                <p:oleObj spid="_x0000_s2459" name="公式" r:id="rId18" imgW="292100" imgH="177800" progId="Equation.3">
+                <p:oleObj spid="_x0000_s2235" name="公式" r:id="rId18" imgW="292100" imgH="177800" progId="Equation.3">
                   <p:embed/>
                 </p:oleObj>
               </mc:Choice>
@@ -11489,7 +11759,7 @@
           <a:graphicData uri="http://schemas.openxmlformats.org/presentationml/2006/ole">
             <mc:AlternateContent xmlns:mc="http://schemas.openxmlformats.org/markup-compatibility/2006">
               <mc:Choice xmlns:v="urn:schemas-microsoft-com:vml" Requires="v">
-                <p:oleObj spid="_x0000_s2460" name="公式" r:id="rId19" imgW="292100" imgH="177800" progId="Equation.3">
+                <p:oleObj spid="_x0000_s2236" name="公式" r:id="rId19" imgW="292100" imgH="177800" progId="Equation.3">
                   <p:embed/>
                 </p:oleObj>
               </mc:Choice>
@@ -12170,7 +12440,7 @@
           <a:graphicData uri="http://schemas.openxmlformats.org/presentationml/2006/ole">
             <mc:AlternateContent xmlns:mc="http://schemas.openxmlformats.org/markup-compatibility/2006">
               <mc:Choice xmlns:v="urn:schemas-microsoft-com:vml" Requires="v">
-                <p:oleObj spid="_x0000_s2461" name="公式" r:id="rId20" imgW="673100" imgH="241300" progId="Equation.3">
+                <p:oleObj spid="_x0000_s2237" name="公式" r:id="rId20" imgW="673100" imgH="241300" progId="Equation.3">
                   <p:embed/>
                 </p:oleObj>
               </mc:Choice>
@@ -12227,7 +12497,7 @@
           <a:graphicData uri="http://schemas.openxmlformats.org/presentationml/2006/ole">
             <mc:AlternateContent xmlns:mc="http://schemas.openxmlformats.org/markup-compatibility/2006">
               <mc:Choice xmlns:v="urn:schemas-microsoft-com:vml" Requires="v">
-                <p:oleObj spid="_x0000_s2462" name="公式" r:id="rId22" imgW="673100" imgH="241300" progId="Equation.3">
+                <p:oleObj spid="_x0000_s2238" name="公式" r:id="rId22" imgW="673100" imgH="241300" progId="Equation.3">
                   <p:embed/>
                 </p:oleObj>
               </mc:Choice>
@@ -15213,7 +15483,7 @@
           <a:graphicData uri="http://schemas.openxmlformats.org/presentationml/2006/ole">
             <mc:AlternateContent xmlns:mc="http://schemas.openxmlformats.org/markup-compatibility/2006">
               <mc:Choice xmlns:v="urn:schemas-microsoft-com:vml" Requires="v">
-                <p:oleObj spid="_x0000_s2463" name="公式" r:id="rId24" imgW="711200" imgH="241300" progId="Equation.3">
+                <p:oleObj spid="_x0000_s2239" name="公式" r:id="rId24" imgW="711200" imgH="241300" progId="Equation.3">
                   <p:embed/>
                 </p:oleObj>
               </mc:Choice>
@@ -15418,7 +15688,7 @@
           <a:noFill/>
           <a:extLst>
             <a:ext uri="{909E8E84-426E-40dd-AFC4-6F175D3DCCD1}">
-              <a14:hiddenFill xmlns:a14="http://schemas.microsoft.com/office/drawing/2010/main" xmlns="">
+              <a14:hiddenFill xmlns="" xmlns:a14="http://schemas.microsoft.com/office/drawing/2010/main">
                 <a:solidFill>
                   <a:srgbClr val="FFFFFF"/>
                 </a:solidFill>
@@ -16318,7 +16588,7 @@
           <a:noFill/>
           <a:extLst>
             <a:ext uri="{909E8E84-426E-40dd-AFC4-6F175D3DCCD1}">
-              <a14:hiddenFill xmlns:a14="http://schemas.microsoft.com/office/drawing/2010/main" xmlns="">
+              <a14:hiddenFill xmlns="" xmlns:a14="http://schemas.microsoft.com/office/drawing/2010/main">
                 <a:solidFill>
                   <a:srgbClr val="FFFFFF"/>
                 </a:solidFill>
@@ -16550,7 +16820,7 @@
           <a:noFill/>
           <a:extLst>
             <a:ext uri="{909E8E84-426E-40dd-AFC4-6F175D3DCCD1}">
-              <a14:hiddenFill xmlns:a14="http://schemas.microsoft.com/office/drawing/2010/main" xmlns="">
+              <a14:hiddenFill xmlns="" xmlns:a14="http://schemas.microsoft.com/office/drawing/2010/main">
                 <a:solidFill>
                   <a:srgbClr val="FFFFFF"/>
                 </a:solidFill>
@@ -17505,7 +17775,7 @@
           <a:noFill/>
           <a:extLst>
             <a:ext uri="{909E8E84-426E-40dd-AFC4-6F175D3DCCD1}">
-              <a14:hiddenFill xmlns:a14="http://schemas.microsoft.com/office/drawing/2010/main" xmlns="">
+              <a14:hiddenFill xmlns="" xmlns:a14="http://schemas.microsoft.com/office/drawing/2010/main">
                 <a:solidFill>
                   <a:srgbClr val="FFFFFF"/>
                 </a:solidFill>

</xml_diff>